<commit_message>
Several minor changes, as per team meeting
Mostly to get all in sync with MSVS2022.
</commit_message>
<xml_diff>
--- a/Chap/OOProg02/Presentations/InheritancePoly.pptx
+++ b/Chap/OOProg02/Presentations/InheritancePoly.pptx
@@ -249,7 +249,7 @@
           <a:p>
             <a:fld id="{E15B7D8E-2A20-4C0E-991C-872DBB7459A8}" type="datetimeFigureOut">
               <a:rPr lang="da-DK" smtClean="0"/>
-              <a:t>12-08-2022</a:t>
+              <a:t>20-08-2022</a:t>
             </a:fld>
             <a:endParaRPr lang="da-DK"/>
           </a:p>
@@ -417,7 +417,7 @@
           <a:p>
             <a:fld id="{E15B7D8E-2A20-4C0E-991C-872DBB7459A8}" type="datetimeFigureOut">
               <a:rPr lang="da-DK" smtClean="0"/>
-              <a:t>12-08-2022</a:t>
+              <a:t>20-08-2022</a:t>
             </a:fld>
             <a:endParaRPr lang="da-DK"/>
           </a:p>
@@ -595,7 +595,7 @@
           <a:p>
             <a:fld id="{E15B7D8E-2A20-4C0E-991C-872DBB7459A8}" type="datetimeFigureOut">
               <a:rPr lang="da-DK" smtClean="0"/>
-              <a:t>12-08-2022</a:t>
+              <a:t>20-08-2022</a:t>
             </a:fld>
             <a:endParaRPr lang="da-DK"/>
           </a:p>
@@ -763,7 +763,7 @@
           <a:p>
             <a:fld id="{E15B7D8E-2A20-4C0E-991C-872DBB7459A8}" type="datetimeFigureOut">
               <a:rPr lang="da-DK" smtClean="0"/>
-              <a:t>12-08-2022</a:t>
+              <a:t>20-08-2022</a:t>
             </a:fld>
             <a:endParaRPr lang="da-DK"/>
           </a:p>
@@ -1008,7 +1008,7 @@
           <a:p>
             <a:fld id="{E15B7D8E-2A20-4C0E-991C-872DBB7459A8}" type="datetimeFigureOut">
               <a:rPr lang="da-DK" smtClean="0"/>
-              <a:t>12-08-2022</a:t>
+              <a:t>20-08-2022</a:t>
             </a:fld>
             <a:endParaRPr lang="da-DK"/>
           </a:p>
@@ -1237,7 +1237,7 @@
           <a:p>
             <a:fld id="{E15B7D8E-2A20-4C0E-991C-872DBB7459A8}" type="datetimeFigureOut">
               <a:rPr lang="da-DK" smtClean="0"/>
-              <a:t>12-08-2022</a:t>
+              <a:t>20-08-2022</a:t>
             </a:fld>
             <a:endParaRPr lang="da-DK"/>
           </a:p>
@@ -1601,7 +1601,7 @@
           <a:p>
             <a:fld id="{E15B7D8E-2A20-4C0E-991C-872DBB7459A8}" type="datetimeFigureOut">
               <a:rPr lang="da-DK" smtClean="0"/>
-              <a:t>12-08-2022</a:t>
+              <a:t>20-08-2022</a:t>
             </a:fld>
             <a:endParaRPr lang="da-DK"/>
           </a:p>
@@ -1718,7 +1718,7 @@
           <a:p>
             <a:fld id="{E15B7D8E-2A20-4C0E-991C-872DBB7459A8}" type="datetimeFigureOut">
               <a:rPr lang="da-DK" smtClean="0"/>
-              <a:t>12-08-2022</a:t>
+              <a:t>20-08-2022</a:t>
             </a:fld>
             <a:endParaRPr lang="da-DK"/>
           </a:p>
@@ -1813,7 +1813,7 @@
           <a:p>
             <a:fld id="{E15B7D8E-2A20-4C0E-991C-872DBB7459A8}" type="datetimeFigureOut">
               <a:rPr lang="da-DK" smtClean="0"/>
-              <a:t>12-08-2022</a:t>
+              <a:t>20-08-2022</a:t>
             </a:fld>
             <a:endParaRPr lang="da-DK"/>
           </a:p>
@@ -2088,7 +2088,7 @@
           <a:p>
             <a:fld id="{E15B7D8E-2A20-4C0E-991C-872DBB7459A8}" type="datetimeFigureOut">
               <a:rPr lang="da-DK" smtClean="0"/>
-              <a:t>12-08-2022</a:t>
+              <a:t>20-08-2022</a:t>
             </a:fld>
             <a:endParaRPr lang="da-DK"/>
           </a:p>
@@ -2340,7 +2340,7 @@
           <a:p>
             <a:fld id="{E15B7D8E-2A20-4C0E-991C-872DBB7459A8}" type="datetimeFigureOut">
               <a:rPr lang="da-DK" smtClean="0"/>
-              <a:t>12-08-2022</a:t>
+              <a:t>20-08-2022</a:t>
             </a:fld>
             <a:endParaRPr lang="da-DK"/>
           </a:p>
@@ -2551,7 +2551,7 @@
           <a:p>
             <a:fld id="{E15B7D8E-2A20-4C0E-991C-872DBB7459A8}" type="datetimeFigureOut">
               <a:rPr lang="da-DK" smtClean="0"/>
-              <a:t>12-08-2022</a:t>
+              <a:t>20-08-2022</a:t>
             </a:fld>
             <a:endParaRPr lang="da-DK"/>
           </a:p>
@@ -3253,16 +3253,15 @@
           </p:cNvPicPr>
           <p:nvPr/>
         </p:nvPicPr>
-        <p:blipFill>
+        <p:blipFill rotWithShape="1">
           <a:blip r:embed="rId2"/>
-          <a:stretch>
-            <a:fillRect/>
-          </a:stretch>
+          <a:srcRect t="20454"/>
+          <a:stretch/>
         </p:blipFill>
         <p:spPr>
           <a:xfrm>
-            <a:off x="4663216" y="4216066"/>
-            <a:ext cx="3590925" cy="1409700"/>
+            <a:off x="4663216" y="4504414"/>
+            <a:ext cx="3590925" cy="1121352"/>
           </a:xfrm>
           <a:prstGeom prst="rect">
             <a:avLst/>
@@ -3595,16 +3594,15 @@
           </p:cNvPicPr>
           <p:nvPr/>
         </p:nvPicPr>
-        <p:blipFill>
+        <p:blipFill rotWithShape="1">
           <a:blip r:embed="rId2"/>
-          <a:stretch>
-            <a:fillRect/>
-          </a:stretch>
+          <a:srcRect l="-333" t="21301"/>
+          <a:stretch/>
         </p:blipFill>
         <p:spPr>
           <a:xfrm>
-            <a:off x="4675248" y="4216068"/>
-            <a:ext cx="3609975" cy="1409700"/>
+            <a:off x="4663216" y="4516340"/>
+            <a:ext cx="3622007" cy="1109427"/>
           </a:xfrm>
           <a:prstGeom prst="rect">
             <a:avLst/>
@@ -3963,16 +3961,15 @@
           </p:cNvPicPr>
           <p:nvPr/>
         </p:nvPicPr>
-        <p:blipFill>
+        <p:blipFill rotWithShape="1">
           <a:blip r:embed="rId2"/>
-          <a:stretch>
-            <a:fillRect/>
-          </a:stretch>
+          <a:srcRect t="21865"/>
+          <a:stretch/>
         </p:blipFill>
         <p:spPr>
           <a:xfrm>
-            <a:off x="4663216" y="4216066"/>
-            <a:ext cx="3590925" cy="1409700"/>
+            <a:off x="4663216" y="4524292"/>
+            <a:ext cx="3590925" cy="1101474"/>
           </a:xfrm>
           <a:prstGeom prst="rect">
             <a:avLst/>
@@ -4861,16 +4858,15 @@
           </p:cNvPicPr>
           <p:nvPr/>
         </p:nvPicPr>
-        <p:blipFill>
+        <p:blipFill rotWithShape="1">
           <a:blip r:embed="rId3"/>
-          <a:stretch>
-            <a:fillRect/>
-          </a:stretch>
+          <a:srcRect l="-333" t="20737"/>
+          <a:stretch/>
         </p:blipFill>
         <p:spPr>
           <a:xfrm>
-            <a:off x="4675248" y="4216068"/>
-            <a:ext cx="3609975" cy="1409700"/>
+            <a:off x="4663216" y="4508390"/>
+            <a:ext cx="3622007" cy="1117378"/>
           </a:xfrm>
           <a:prstGeom prst="rect">
             <a:avLst/>
@@ -7430,16 +7426,15 @@
           </p:cNvPicPr>
           <p:nvPr/>
         </p:nvPicPr>
-        <p:blipFill>
+        <p:blipFill rotWithShape="1">
           <a:blip r:embed="rId2"/>
-          <a:stretch>
-            <a:fillRect/>
-          </a:stretch>
+          <a:srcRect l="876" t="18894"/>
+          <a:stretch/>
         </p:blipFill>
         <p:spPr>
           <a:xfrm>
-            <a:off x="4663216" y="5147734"/>
-            <a:ext cx="3657600" cy="1371600"/>
+            <a:off x="4695244" y="5406886"/>
+            <a:ext cx="3625571" cy="1112447"/>
           </a:xfrm>
           <a:prstGeom prst="rect">
             <a:avLst/>

</xml_diff>